<commit_message>
Deploying to gh-pages from @ sean4andrew/safuncs@e5c1a78383fa92df38e58f96edbcda9b709993ec 🚀
</commit_message>
<xml_diff>
--- a/reference/ONDA_XX-Survival Curve.pptx
+++ b/reference/ONDA_XX-Survival Curve.pptx
@@ -6164,8 +6164,8 @@
           </p:nvSpPr>
           <p:spPr>
             <a:xfrm rot="-5400000">
-              <a:off x="340195" y="2509078"/>
-              <a:ext cx="1356072" cy="135197"/>
+              <a:off x="342412" y="2509078"/>
+              <a:ext cx="1351638" cy="135197"/>
             </a:xfrm>
             <a:prstGeom prst="rect">
               <a:avLst/>
@@ -6197,7 +6197,7 @@
                   <a:latin typeface="DejaVu Sans"/>
                   <a:cs typeface="DejaVu Sans"/>
                 </a:rPr>
-                <a:t>Survival probability</a:t>
+                <a:t>Survival Probability</a:t>
               </a:r>
             </a:p>
           </p:txBody>

</xml_diff>